<commit_message>
docs: update final ppt and pdf
</commit_message>
<xml_diff>
--- a/presentations/thesis-nlp-dockerlint-presentation-20260126.pptx
+++ b/presentations/thesis-nlp-dockerlint-presentation-20260126.pptx
@@ -2011,7 +2011,7 @@
           <a:bodyPr/>
           <a:lstStyle/>
           <a:p>
-            <a:fld id="{F1943813-FEA2-42F6-9480-97D6D1553758}" type="datetime1">
+            <a:fld id="{3F922D94-4F74-D141-9C45-681AC0F85F17}" type="datetime1">
               <a:rPr lang="en-US" smtClean="0"/>
               <a:t>1/26/26</a:t>
             </a:fld>
@@ -2179,7 +2179,7 @@
           <a:bodyPr/>
           <a:lstStyle/>
           <a:p>
-            <a:fld id="{86CB5899-D66E-450D-B498-474F1836B93C}" type="datetime1">
+            <a:fld id="{C4BD0471-DF48-1A47-A60D-C3089D9A754E}" type="datetime1">
               <a:rPr lang="en-US" smtClean="0"/>
               <a:t>1/26/26</a:t>
             </a:fld>
@@ -2357,7 +2357,7 @@
           <a:bodyPr/>
           <a:lstStyle/>
           <a:p>
-            <a:fld id="{F25729D5-E30D-4474-9225-3E79467B42A7}" type="datetime1">
+            <a:fld id="{07769518-0C98-2D40-AC2D-DEF7580F73AB}" type="datetime1">
               <a:rPr lang="en-US" smtClean="0"/>
               <a:t>1/26/26</a:t>
             </a:fld>
@@ -2525,7 +2525,7 @@
           <a:bodyPr/>
           <a:lstStyle/>
           <a:p>
-            <a:fld id="{E20BB741-4786-40F0-B291-DF879061B863}" type="datetime1">
+            <a:fld id="{D1EE334C-B35F-A743-9E08-DA7A7A059240}" type="datetime1">
               <a:rPr lang="en-US" smtClean="0"/>
               <a:t>1/26/26</a:t>
             </a:fld>
@@ -2562,7 +2562,12 @@
             <p:ph type="sldNum" sz="quarter" idx="12"/>
           </p:nvPr>
         </p:nvSpPr>
-        <p:spPr/>
+        <p:spPr>
+          <a:xfrm>
+            <a:off x="8546538" y="6311900"/>
+            <a:ext cx="2743200" cy="365125"/>
+          </a:xfrm>
+        </p:spPr>
         <p:txBody>
           <a:bodyPr/>
           <a:lstStyle/>
@@ -2571,7 +2576,7 @@
               <a:rPr lang="en-US" smtClean="0"/>
               <a:t>‹#›</a:t>
             </a:fld>
-            <a:endParaRPr lang="en-US"/>
+            <a:endParaRPr lang="en-US" dirty="0"/>
           </a:p>
         </p:txBody>
       </p:sp>
@@ -2770,7 +2775,7 @@
           <a:bodyPr/>
           <a:lstStyle/>
           <a:p>
-            <a:fld id="{4E007C2A-953A-4930-897A-083C625CCBF5}" type="datetime1">
+            <a:fld id="{775F0880-CA87-2844-BB69-0CEC1E6C036A}" type="datetime1">
               <a:rPr lang="en-US" smtClean="0"/>
               <a:t>1/26/26</a:t>
             </a:fld>
@@ -2999,7 +3004,7 @@
           <a:bodyPr/>
           <a:lstStyle/>
           <a:p>
-            <a:fld id="{03A17A9A-E8B0-4AC4-A041-3570860C4141}" type="datetime1">
+            <a:fld id="{6E367C54-B175-9D4E-889B-12B4E7550B95}" type="datetime1">
               <a:rPr lang="en-US" smtClean="0"/>
               <a:t>1/26/26</a:t>
             </a:fld>
@@ -3363,7 +3368,7 @@
           <a:bodyPr/>
           <a:lstStyle/>
           <a:p>
-            <a:fld id="{05A47BD2-6660-4B44-93F6-4ED7B9FE4617}" type="datetime1">
+            <a:fld id="{86B0607A-9226-8F4B-9A47-9588CBED766B}" type="datetime1">
               <a:rPr lang="en-US" smtClean="0"/>
               <a:t>1/26/26</a:t>
             </a:fld>
@@ -3480,7 +3485,7 @@
           <a:bodyPr/>
           <a:lstStyle/>
           <a:p>
-            <a:fld id="{5BF6FE6F-55C6-4D82-8F14-65F1D3A42F48}" type="datetime1">
+            <a:fld id="{F396FBCD-B0DF-3D41-957A-C67E7E39247A}" type="datetime1">
               <a:rPr lang="en-US" smtClean="0"/>
               <a:t>1/26/26</a:t>
             </a:fld>
@@ -3575,7 +3580,7 @@
           <a:bodyPr/>
           <a:lstStyle/>
           <a:p>
-            <a:fld id="{E8F42C08-EB8A-4AAD-8191-B20CCB1CAFE0}" type="datetime1">
+            <a:fld id="{E0A1F095-2760-5842-9942-27CA2570A193}" type="datetime1">
               <a:rPr lang="en-US" smtClean="0"/>
               <a:t>1/26/26</a:t>
             </a:fld>
@@ -3850,7 +3855,7 @@
           <a:bodyPr/>
           <a:lstStyle/>
           <a:p>
-            <a:fld id="{55AACD24-ACE9-4223-9171-AECE615FB3C3}" type="datetime1">
+            <a:fld id="{3B7E0729-C53D-D744-B302-034A341762D1}" type="datetime1">
               <a:rPr lang="en-US" smtClean="0"/>
               <a:t>1/26/26</a:t>
             </a:fld>
@@ -4102,7 +4107,7 @@
           <a:bodyPr/>
           <a:lstStyle/>
           <a:p>
-            <a:fld id="{37A79FA2-1D8B-4708-92E1-BA6164E68805}" type="datetime1">
+            <a:fld id="{BE4715BF-09D3-B044-867C-9A5C13405B24}" type="datetime1">
               <a:rPr lang="en-US" smtClean="0"/>
               <a:t>1/26/26</a:t>
             </a:fld>
@@ -4313,7 +4318,7 @@
             </a:lvl1pPr>
           </a:lstStyle>
           <a:p>
-            <a:fld id="{ADD8F7D7-7AD1-4749-8460-879CB9012590}" type="datetime1">
+            <a:fld id="{1A7A319B-C9C2-5449-BE3F-46A46D5EF03E}" type="datetime1">
               <a:rPr lang="en-US" smtClean="0"/>
               <a:t>1/26/26</a:t>
             </a:fld>
@@ -4420,7 +4425,7 @@
     <p:sldLayoutId id="2147483658" r:id="rId10"/>
     <p:sldLayoutId id="2147483659" r:id="rId11"/>
   </p:sldLayoutIdLst>
-  <p:hf sldNum="0" hdr="0" ftr="0" dt="0"/>
+  <p:hf hdr="0" ftr="0" dt="0"/>
   <p:txStyles>
     <p:titleStyle>
       <a:lvl1pPr algn="l" defTabSz="914400" rtl="0" eaLnBrk="1" latinLnBrk="0" hangingPunct="1">
@@ -5064,21 +5069,7 @@
                 <a:latin typeface="Times New Roman" panose="02020603050405020304" pitchFamily="18" charset="0"/>
                 <a:cs typeface="Times New Roman" panose="02020603050405020304" pitchFamily="18" charset="0"/>
               </a:rPr>
-              <a:t>Date: </a:t>
-            </a:r>
-            <a:r>
-              <a:rPr lang="en-US" sz="2600">
-                <a:latin typeface="Times New Roman" panose="02020603050405020304" pitchFamily="18" charset="0"/>
-                <a:cs typeface="Times New Roman" panose="02020603050405020304" pitchFamily="18" charset="0"/>
-              </a:rPr>
-              <a:t>January 26, </a:t>
-            </a:r>
-            <a:r>
-              <a:rPr lang="en-US" sz="2600" dirty="0">
-                <a:latin typeface="Times New Roman" panose="02020603050405020304" pitchFamily="18" charset="0"/>
-                <a:cs typeface="Times New Roman" panose="02020603050405020304" pitchFamily="18" charset="0"/>
-              </a:rPr>
-              <a:t>2026  </a:t>
+              <a:t>Date: January 26, 2026  </a:t>
             </a:r>
           </a:p>
         </p:txBody>
@@ -5113,6 +5104,35 @@
           </a:prstGeom>
         </p:spPr>
       </p:pic>
+      <p:sp>
+        <p:nvSpPr>
+          <p:cNvPr id="6" name="Slide Number Placeholder 5">
+            <a:extLst>
+              <a:ext uri="{FF2B5EF4-FFF2-40B4-BE49-F238E27FC236}">
+                <a16:creationId xmlns:a16="http://schemas.microsoft.com/office/drawing/2014/main" id="{036E1729-2556-A693-85A8-DE4A70C17ED8}"/>
+              </a:ext>
+            </a:extLst>
+          </p:cNvPr>
+          <p:cNvSpPr>
+            <a:spLocks noGrp="1"/>
+          </p:cNvSpPr>
+          <p:nvPr>
+            <p:ph type="sldNum" sz="quarter" idx="12"/>
+          </p:nvPr>
+        </p:nvSpPr>
+        <p:spPr/>
+        <p:txBody>
+          <a:bodyPr/>
+          <a:lstStyle/>
+          <a:p>
+            <a:fld id="{151E060D-FAFC-4189-907A-7AE29CACBD1A}" type="slidenum">
+              <a:rPr lang="en-US" smtClean="0"/>
+              <a:t>1</a:t>
+            </a:fld>
+            <a:endParaRPr lang="en-US"/>
+          </a:p>
+        </p:txBody>
+      </p:sp>
     </p:spTree>
     <p:extLst>
       <p:ext uri="{BB962C8B-B14F-4D97-AF65-F5344CB8AC3E}">
@@ -5211,14 +5231,14 @@
           <p:nvPr>
             <p:extLst>
               <p:ext uri="{D42A27DB-BD31-4B8C-83A1-F6EECF244321}">
-                <p14:modId xmlns:p14="http://schemas.microsoft.com/office/powerpoint/2010/main" val="2418686154"/>
+                <p14:modId xmlns:p14="http://schemas.microsoft.com/office/powerpoint/2010/main" val="1735766865"/>
               </p:ext>
             </p:extLst>
           </p:nvPr>
         </p:nvGraphicFramePr>
         <p:xfrm>
           <a:off x="838200" y="1512117"/>
-          <a:ext cx="10515600" cy="5154299"/>
+          <a:ext cx="10221686" cy="5126393"/>
         </p:xfrm>
         <a:graphic>
           <a:graphicData uri="http://schemas.openxmlformats.org/drawingml/2006/table">
@@ -5227,35 +5247,35 @@
                 <a:tableStyleId>{5940675A-B579-460E-94D1-54222C63F5DA}</a:tableStyleId>
               </a:tblPr>
               <a:tblGrid>
-                <a:gridCol w="668383">
+                <a:gridCol w="649702">
                   <a:extLst>
                     <a:ext uri="{9D8B030D-6E8A-4147-A177-3AD203B41FA5}">
                       <a16:colId xmlns:a16="http://schemas.microsoft.com/office/drawing/2014/main" val="3610803471"/>
                     </a:ext>
                   </a:extLst>
                 </a:gridCol>
-                <a:gridCol w="3380171">
+                <a:gridCol w="3285694">
                   <a:extLst>
                     <a:ext uri="{9D8B030D-6E8A-4147-A177-3AD203B41FA5}">
                       <a16:colId xmlns:a16="http://schemas.microsoft.com/office/drawing/2014/main" val="3694535918"/>
                     </a:ext>
                   </a:extLst>
                 </a:gridCol>
-                <a:gridCol w="1574439">
+                <a:gridCol w="1530433">
                   <a:extLst>
                     <a:ext uri="{9D8B030D-6E8A-4147-A177-3AD203B41FA5}">
                       <a16:colId xmlns:a16="http://schemas.microsoft.com/office/drawing/2014/main" val="1246209434"/>
                     </a:ext>
                   </a:extLst>
                 </a:gridCol>
-                <a:gridCol w="2474116">
+                <a:gridCol w="2404964">
                   <a:extLst>
                     <a:ext uri="{9D8B030D-6E8A-4147-A177-3AD203B41FA5}">
                       <a16:colId xmlns:a16="http://schemas.microsoft.com/office/drawing/2014/main" val="119443403"/>
                     </a:ext>
                   </a:extLst>
                 </a:gridCol>
-                <a:gridCol w="2418491">
+                <a:gridCol w="2350893">
                   <a:extLst>
                     <a:ext uri="{9D8B030D-6E8A-4147-A177-3AD203B41FA5}">
                       <a16:colId xmlns:a16="http://schemas.microsoft.com/office/drawing/2014/main" val="3426055835"/>
@@ -5263,7 +5283,7 @@
                   </a:extLst>
                 </a:gridCol>
               </a:tblGrid>
-              <a:tr h="478580">
+              <a:tr h="462953">
                 <a:tc>
                   <a:txBody>
                     <a:bodyPr/>
@@ -5355,7 +5375,7 @@
                   </a:ext>
                 </a:extLst>
               </a:tr>
-              <a:tr h="889460">
+              <a:tr h="884543">
                 <a:tc>
                   <a:txBody>
                     <a:bodyPr/>
@@ -5491,7 +5511,7 @@
                   </a:ext>
                 </a:extLst>
               </a:tr>
-              <a:tr h="618667">
+              <a:tr h="884543">
                 <a:tc>
                   <a:txBody>
                     <a:bodyPr/>
@@ -5602,7 +5622,7 @@
                   </a:ext>
                 </a:extLst>
               </a:tr>
-              <a:tr h="618668">
+              <a:tr h="619180">
                 <a:tc>
                   <a:txBody>
                     <a:bodyPr/>
@@ -5724,7 +5744,7 @@
                   </a:ext>
                 </a:extLst>
               </a:tr>
-              <a:tr h="584975">
+              <a:tr h="884543">
                 <a:tc>
                   <a:txBody>
                     <a:bodyPr/>
@@ -5839,7 +5859,7 @@
                   </a:ext>
                 </a:extLst>
               </a:tr>
-              <a:tr h="652359">
+              <a:tr h="631058">
                 <a:tc>
                   <a:txBody>
                     <a:bodyPr/>
@@ -5968,7 +5988,7 @@
                   </a:ext>
                 </a:extLst>
               </a:tr>
-              <a:tr h="614512">
+              <a:tr h="619180">
                 <a:tc>
                   <a:txBody>
                     <a:bodyPr/>
@@ -6139,6 +6159,35 @@
           </a:p>
         </p:txBody>
       </p:sp>
+      <p:sp>
+        <p:nvSpPr>
+          <p:cNvPr id="4" name="Slide Number Placeholder 3">
+            <a:extLst>
+              <a:ext uri="{FF2B5EF4-FFF2-40B4-BE49-F238E27FC236}">
+                <a16:creationId xmlns:a16="http://schemas.microsoft.com/office/drawing/2014/main" id="{4A799D5C-C922-4242-3BA4-1E7D5E5649B0}"/>
+              </a:ext>
+            </a:extLst>
+          </p:cNvPr>
+          <p:cNvSpPr>
+            <a:spLocks noGrp="1"/>
+          </p:cNvSpPr>
+          <p:nvPr>
+            <p:ph type="sldNum" sz="quarter" idx="12"/>
+          </p:nvPr>
+        </p:nvSpPr>
+        <p:spPr/>
+        <p:txBody>
+          <a:bodyPr/>
+          <a:lstStyle/>
+          <a:p>
+            <a:fld id="{151E060D-FAFC-4189-907A-7AE29CACBD1A}" type="slidenum">
+              <a:rPr lang="en-US" smtClean="0"/>
+              <a:t>10</a:t>
+            </a:fld>
+            <a:endParaRPr lang="en-US"/>
+          </a:p>
+        </p:txBody>
+      </p:sp>
     </p:spTree>
     <p:extLst>
       <p:ext uri="{BB962C8B-B14F-4D97-AF65-F5344CB8AC3E}">
@@ -6322,6 +6371,35 @@
           </a:prstGeom>
         </p:spPr>
       </p:pic>
+      <p:sp>
+        <p:nvSpPr>
+          <p:cNvPr id="4" name="Slide Number Placeholder 3">
+            <a:extLst>
+              <a:ext uri="{FF2B5EF4-FFF2-40B4-BE49-F238E27FC236}">
+                <a16:creationId xmlns:a16="http://schemas.microsoft.com/office/drawing/2014/main" id="{0B9C02CD-7884-7A93-9E70-B470815601C7}"/>
+              </a:ext>
+            </a:extLst>
+          </p:cNvPr>
+          <p:cNvSpPr>
+            <a:spLocks noGrp="1"/>
+          </p:cNvSpPr>
+          <p:nvPr>
+            <p:ph type="sldNum" sz="quarter" idx="12"/>
+          </p:nvPr>
+        </p:nvSpPr>
+        <p:spPr/>
+        <p:txBody>
+          <a:bodyPr/>
+          <a:lstStyle/>
+          <a:p>
+            <a:fld id="{151E060D-FAFC-4189-907A-7AE29CACBD1A}" type="slidenum">
+              <a:rPr lang="en-US" smtClean="0"/>
+              <a:t>11</a:t>
+            </a:fld>
+            <a:endParaRPr lang="en-US"/>
+          </a:p>
+        </p:txBody>
+      </p:sp>
     </p:spTree>
     <p:extLst>
       <p:ext uri="{BB962C8B-B14F-4D97-AF65-F5344CB8AC3E}">
@@ -6589,6 +6667,35 @@
           </a:p>
         </p:txBody>
       </p:sp>
+      <p:sp>
+        <p:nvSpPr>
+          <p:cNvPr id="5" name="Slide Number Placeholder 4">
+            <a:extLst>
+              <a:ext uri="{FF2B5EF4-FFF2-40B4-BE49-F238E27FC236}">
+                <a16:creationId xmlns:a16="http://schemas.microsoft.com/office/drawing/2014/main" id="{ED7C89EB-CC6C-2571-F907-A3DEB5820874}"/>
+              </a:ext>
+            </a:extLst>
+          </p:cNvPr>
+          <p:cNvSpPr>
+            <a:spLocks noGrp="1"/>
+          </p:cNvSpPr>
+          <p:nvPr>
+            <p:ph type="sldNum" sz="quarter" idx="12"/>
+          </p:nvPr>
+        </p:nvSpPr>
+        <p:spPr/>
+        <p:txBody>
+          <a:bodyPr/>
+          <a:lstStyle/>
+          <a:p>
+            <a:fld id="{151E060D-FAFC-4189-907A-7AE29CACBD1A}" type="slidenum">
+              <a:rPr lang="en-US" smtClean="0"/>
+              <a:t>12</a:t>
+            </a:fld>
+            <a:endParaRPr lang="en-US"/>
+          </a:p>
+        </p:txBody>
+      </p:sp>
     </p:spTree>
     <p:extLst>
       <p:ext uri="{BB962C8B-B14F-4D97-AF65-F5344CB8AC3E}">
@@ -6745,6 +6852,35 @@
           </a:p>
         </p:txBody>
       </p:sp>
+      <p:sp>
+        <p:nvSpPr>
+          <p:cNvPr id="5" name="Slide Number Placeholder 4">
+            <a:extLst>
+              <a:ext uri="{FF2B5EF4-FFF2-40B4-BE49-F238E27FC236}">
+                <a16:creationId xmlns:a16="http://schemas.microsoft.com/office/drawing/2014/main" id="{EFD18268-451C-B4BE-0269-AA31C1A0E4E3}"/>
+              </a:ext>
+            </a:extLst>
+          </p:cNvPr>
+          <p:cNvSpPr>
+            <a:spLocks noGrp="1"/>
+          </p:cNvSpPr>
+          <p:nvPr>
+            <p:ph type="sldNum" sz="quarter" idx="12"/>
+          </p:nvPr>
+        </p:nvSpPr>
+        <p:spPr/>
+        <p:txBody>
+          <a:bodyPr/>
+          <a:lstStyle/>
+          <a:p>
+            <a:fld id="{151E060D-FAFC-4189-907A-7AE29CACBD1A}" type="slidenum">
+              <a:rPr lang="en-US" smtClean="0"/>
+              <a:t>13</a:t>
+            </a:fld>
+            <a:endParaRPr lang="en-US"/>
+          </a:p>
+        </p:txBody>
+      </p:sp>
     </p:spTree>
     <p:extLst>
       <p:ext uri="{BB962C8B-B14F-4D97-AF65-F5344CB8AC3E}">
@@ -6899,6 +7035,35 @@
               </a:rPr>
               <a:t>Separate strategies for stage 1 and stage 2</a:t>
             </a:r>
+          </a:p>
+        </p:txBody>
+      </p:sp>
+      <p:sp>
+        <p:nvSpPr>
+          <p:cNvPr id="5" name="Slide Number Placeholder 4">
+            <a:extLst>
+              <a:ext uri="{FF2B5EF4-FFF2-40B4-BE49-F238E27FC236}">
+                <a16:creationId xmlns:a16="http://schemas.microsoft.com/office/drawing/2014/main" id="{9288F759-EC2D-6BFA-690D-726F91BF335B}"/>
+              </a:ext>
+            </a:extLst>
+          </p:cNvPr>
+          <p:cNvSpPr>
+            <a:spLocks noGrp="1"/>
+          </p:cNvSpPr>
+          <p:nvPr>
+            <p:ph type="sldNum" sz="quarter" idx="12"/>
+          </p:nvPr>
+        </p:nvSpPr>
+        <p:spPr/>
+        <p:txBody>
+          <a:bodyPr/>
+          <a:lstStyle/>
+          <a:p>
+            <a:fld id="{151E060D-FAFC-4189-907A-7AE29CACBD1A}" type="slidenum">
+              <a:rPr lang="en-US" smtClean="0"/>
+              <a:t>14</a:t>
+            </a:fld>
+            <a:endParaRPr lang="en-US"/>
           </a:p>
         </p:txBody>
       </p:sp>
@@ -7570,6 +7735,35 @@
           </a:graphicData>
         </a:graphic>
       </p:graphicFrame>
+      <p:sp>
+        <p:nvSpPr>
+          <p:cNvPr id="6" name="Slide Number Placeholder 5">
+            <a:extLst>
+              <a:ext uri="{FF2B5EF4-FFF2-40B4-BE49-F238E27FC236}">
+                <a16:creationId xmlns:a16="http://schemas.microsoft.com/office/drawing/2014/main" id="{80969871-ABAB-4300-D8ED-838324BA590B}"/>
+              </a:ext>
+            </a:extLst>
+          </p:cNvPr>
+          <p:cNvSpPr>
+            <a:spLocks noGrp="1"/>
+          </p:cNvSpPr>
+          <p:nvPr>
+            <p:ph type="sldNum" sz="quarter" idx="12"/>
+          </p:nvPr>
+        </p:nvSpPr>
+        <p:spPr/>
+        <p:txBody>
+          <a:bodyPr/>
+          <a:lstStyle/>
+          <a:p>
+            <a:fld id="{151E060D-FAFC-4189-907A-7AE29CACBD1A}" type="slidenum">
+              <a:rPr lang="en-US" smtClean="0"/>
+              <a:t>15</a:t>
+            </a:fld>
+            <a:endParaRPr lang="en-US"/>
+          </a:p>
+        </p:txBody>
+      </p:sp>
     </p:spTree>
     <p:extLst>
       <p:ext uri="{BB962C8B-B14F-4D97-AF65-F5344CB8AC3E}">
@@ -7781,6 +7975,35 @@
           </a:fontRef>
         </p:style>
       </p:cxnSp>
+      <p:sp>
+        <p:nvSpPr>
+          <p:cNvPr id="5" name="Slide Number Placeholder 4">
+            <a:extLst>
+              <a:ext uri="{FF2B5EF4-FFF2-40B4-BE49-F238E27FC236}">
+                <a16:creationId xmlns:a16="http://schemas.microsoft.com/office/drawing/2014/main" id="{68F62027-0AF8-9FCA-6E1D-BBE019F18657}"/>
+              </a:ext>
+            </a:extLst>
+          </p:cNvPr>
+          <p:cNvSpPr>
+            <a:spLocks noGrp="1"/>
+          </p:cNvSpPr>
+          <p:nvPr>
+            <p:ph type="sldNum" sz="quarter" idx="12"/>
+          </p:nvPr>
+        </p:nvSpPr>
+        <p:spPr/>
+        <p:txBody>
+          <a:bodyPr/>
+          <a:lstStyle/>
+          <a:p>
+            <a:fld id="{151E060D-FAFC-4189-907A-7AE29CACBD1A}" type="slidenum">
+              <a:rPr lang="en-US" smtClean="0"/>
+              <a:t>16</a:t>
+            </a:fld>
+            <a:endParaRPr lang="en-US"/>
+          </a:p>
+        </p:txBody>
+      </p:sp>
     </p:spTree>
     <p:extLst>
       <p:ext uri="{BB962C8B-B14F-4D97-AF65-F5344CB8AC3E}">
@@ -8667,6 +8890,35 @@
           </a:graphicData>
         </a:graphic>
       </p:graphicFrame>
+      <p:sp>
+        <p:nvSpPr>
+          <p:cNvPr id="6" name="Slide Number Placeholder 5">
+            <a:extLst>
+              <a:ext uri="{FF2B5EF4-FFF2-40B4-BE49-F238E27FC236}">
+                <a16:creationId xmlns:a16="http://schemas.microsoft.com/office/drawing/2014/main" id="{71A5FCD8-3AD1-30C1-3EB1-60DFD7B21FEA}"/>
+              </a:ext>
+            </a:extLst>
+          </p:cNvPr>
+          <p:cNvSpPr>
+            <a:spLocks noGrp="1"/>
+          </p:cNvSpPr>
+          <p:nvPr>
+            <p:ph type="sldNum" sz="quarter" idx="12"/>
+          </p:nvPr>
+        </p:nvSpPr>
+        <p:spPr/>
+        <p:txBody>
+          <a:bodyPr/>
+          <a:lstStyle/>
+          <a:p>
+            <a:fld id="{151E060D-FAFC-4189-907A-7AE29CACBD1A}" type="slidenum">
+              <a:rPr lang="en-US" smtClean="0"/>
+              <a:t>17</a:t>
+            </a:fld>
+            <a:endParaRPr lang="en-US"/>
+          </a:p>
+        </p:txBody>
+      </p:sp>
     </p:spTree>
     <p:extLst>
       <p:ext uri="{BB962C8B-B14F-4D97-AF65-F5344CB8AC3E}">
@@ -8907,6 +9159,35 @@
           </a:fontRef>
         </p:style>
       </p:cxnSp>
+      <p:sp>
+        <p:nvSpPr>
+          <p:cNvPr id="5" name="Slide Number Placeholder 4">
+            <a:extLst>
+              <a:ext uri="{FF2B5EF4-FFF2-40B4-BE49-F238E27FC236}">
+                <a16:creationId xmlns:a16="http://schemas.microsoft.com/office/drawing/2014/main" id="{298EA26A-9E47-EDC8-0FA0-823A125B1792}"/>
+              </a:ext>
+            </a:extLst>
+          </p:cNvPr>
+          <p:cNvSpPr>
+            <a:spLocks noGrp="1"/>
+          </p:cNvSpPr>
+          <p:nvPr>
+            <p:ph type="sldNum" sz="quarter" idx="12"/>
+          </p:nvPr>
+        </p:nvSpPr>
+        <p:spPr/>
+        <p:txBody>
+          <a:bodyPr/>
+          <a:lstStyle/>
+          <a:p>
+            <a:fld id="{151E060D-FAFC-4189-907A-7AE29CACBD1A}" type="slidenum">
+              <a:rPr lang="en-US" smtClean="0"/>
+              <a:t>18</a:t>
+            </a:fld>
+            <a:endParaRPr lang="en-US"/>
+          </a:p>
+        </p:txBody>
+      </p:sp>
     </p:spTree>
     <p:extLst>
       <p:ext uri="{BB962C8B-B14F-4D97-AF65-F5344CB8AC3E}">
@@ -9071,6 +9352,35 @@
           </a:p>
         </p:txBody>
       </p:sp>
+      <p:sp>
+        <p:nvSpPr>
+          <p:cNvPr id="5" name="Slide Number Placeholder 4">
+            <a:extLst>
+              <a:ext uri="{FF2B5EF4-FFF2-40B4-BE49-F238E27FC236}">
+                <a16:creationId xmlns:a16="http://schemas.microsoft.com/office/drawing/2014/main" id="{564DD034-D021-58DE-3191-A31A7F581B71}"/>
+              </a:ext>
+            </a:extLst>
+          </p:cNvPr>
+          <p:cNvSpPr>
+            <a:spLocks noGrp="1"/>
+          </p:cNvSpPr>
+          <p:nvPr>
+            <p:ph type="sldNum" sz="quarter" idx="12"/>
+          </p:nvPr>
+        </p:nvSpPr>
+        <p:spPr/>
+        <p:txBody>
+          <a:bodyPr/>
+          <a:lstStyle/>
+          <a:p>
+            <a:fld id="{151E060D-FAFC-4189-907A-7AE29CACBD1A}" type="slidenum">
+              <a:rPr lang="en-US" smtClean="0"/>
+              <a:t>19</a:t>
+            </a:fld>
+            <a:endParaRPr lang="en-US"/>
+          </a:p>
+        </p:txBody>
+      </p:sp>
     </p:spTree>
     <p:extLst>
       <p:ext uri="{BB962C8B-B14F-4D97-AF65-F5344CB8AC3E}">
@@ -9263,6 +9573,35 @@
               <a:latin typeface="Times New Roman" panose="02020603050405020304" pitchFamily="18" charset="0"/>
               <a:cs typeface="Times New Roman" panose="02020603050405020304" pitchFamily="18" charset="0"/>
             </a:endParaRPr>
+          </a:p>
+        </p:txBody>
+      </p:sp>
+      <p:sp>
+        <p:nvSpPr>
+          <p:cNvPr id="5" name="Slide Number Placeholder 4">
+            <a:extLst>
+              <a:ext uri="{FF2B5EF4-FFF2-40B4-BE49-F238E27FC236}">
+                <a16:creationId xmlns:a16="http://schemas.microsoft.com/office/drawing/2014/main" id="{614CF36A-C4F9-14F6-30C2-1F601E0D0B67}"/>
+              </a:ext>
+            </a:extLst>
+          </p:cNvPr>
+          <p:cNvSpPr>
+            <a:spLocks noGrp="1"/>
+          </p:cNvSpPr>
+          <p:nvPr>
+            <p:ph type="sldNum" sz="quarter" idx="12"/>
+          </p:nvPr>
+        </p:nvSpPr>
+        <p:spPr/>
+        <p:txBody>
+          <a:bodyPr/>
+          <a:lstStyle/>
+          <a:p>
+            <a:fld id="{151E060D-FAFC-4189-907A-7AE29CACBD1A}" type="slidenum">
+              <a:rPr lang="en-US" smtClean="0"/>
+              <a:t>2</a:t>
+            </a:fld>
+            <a:endParaRPr lang="en-US"/>
           </a:p>
         </p:txBody>
       </p:sp>
@@ -9717,6 +10056,35 @@
           </a:fontRef>
         </p:style>
       </p:cxnSp>
+      <p:sp>
+        <p:nvSpPr>
+          <p:cNvPr id="8" name="Slide Number Placeholder 7">
+            <a:extLst>
+              <a:ext uri="{FF2B5EF4-FFF2-40B4-BE49-F238E27FC236}">
+                <a16:creationId xmlns:a16="http://schemas.microsoft.com/office/drawing/2014/main" id="{F00F9109-05C5-5F23-45A8-331645293CA4}"/>
+              </a:ext>
+            </a:extLst>
+          </p:cNvPr>
+          <p:cNvSpPr>
+            <a:spLocks noGrp="1"/>
+          </p:cNvSpPr>
+          <p:nvPr>
+            <p:ph type="sldNum" sz="quarter" idx="12"/>
+          </p:nvPr>
+        </p:nvSpPr>
+        <p:spPr/>
+        <p:txBody>
+          <a:bodyPr/>
+          <a:lstStyle/>
+          <a:p>
+            <a:fld id="{151E060D-FAFC-4189-907A-7AE29CACBD1A}" type="slidenum">
+              <a:rPr lang="en-US" smtClean="0"/>
+              <a:t>20</a:t>
+            </a:fld>
+            <a:endParaRPr lang="en-US"/>
+          </a:p>
+        </p:txBody>
+      </p:sp>
     </p:spTree>
     <p:extLst>
       <p:ext uri="{BB962C8B-B14F-4D97-AF65-F5344CB8AC3E}">
@@ -10050,6 +10418,35 @@
           </a:p>
         </p:txBody>
       </p:sp>
+      <p:sp>
+        <p:nvSpPr>
+          <p:cNvPr id="7" name="Slide Number Placeholder 6">
+            <a:extLst>
+              <a:ext uri="{FF2B5EF4-FFF2-40B4-BE49-F238E27FC236}">
+                <a16:creationId xmlns:a16="http://schemas.microsoft.com/office/drawing/2014/main" id="{B3FE7828-ECDD-881B-ED1A-BB78D47F4A42}"/>
+              </a:ext>
+            </a:extLst>
+          </p:cNvPr>
+          <p:cNvSpPr>
+            <a:spLocks noGrp="1"/>
+          </p:cNvSpPr>
+          <p:nvPr>
+            <p:ph type="sldNum" sz="quarter" idx="12"/>
+          </p:nvPr>
+        </p:nvSpPr>
+        <p:spPr/>
+        <p:txBody>
+          <a:bodyPr/>
+          <a:lstStyle/>
+          <a:p>
+            <a:fld id="{151E060D-FAFC-4189-907A-7AE29CACBD1A}" type="slidenum">
+              <a:rPr lang="en-US" smtClean="0"/>
+              <a:t>21</a:t>
+            </a:fld>
+            <a:endParaRPr lang="en-US"/>
+          </a:p>
+        </p:txBody>
+      </p:sp>
     </p:spTree>
     <p:extLst>
       <p:ext uri="{BB962C8B-B14F-4D97-AF65-F5344CB8AC3E}">
@@ -10383,6 +10780,35 @@
               </a:rPr>
               <a:t>Epoch-wise checkpointing for reproducibility</a:t>
             </a:r>
+          </a:p>
+        </p:txBody>
+      </p:sp>
+      <p:sp>
+        <p:nvSpPr>
+          <p:cNvPr id="7" name="Slide Number Placeholder 6">
+            <a:extLst>
+              <a:ext uri="{FF2B5EF4-FFF2-40B4-BE49-F238E27FC236}">
+                <a16:creationId xmlns:a16="http://schemas.microsoft.com/office/drawing/2014/main" id="{8C0AECC6-5F59-BF80-25CB-7E9140D26DC2}"/>
+              </a:ext>
+            </a:extLst>
+          </p:cNvPr>
+          <p:cNvSpPr>
+            <a:spLocks noGrp="1"/>
+          </p:cNvSpPr>
+          <p:nvPr>
+            <p:ph type="sldNum" sz="quarter" idx="12"/>
+          </p:nvPr>
+        </p:nvSpPr>
+        <p:spPr/>
+        <p:txBody>
+          <a:bodyPr/>
+          <a:lstStyle/>
+          <a:p>
+            <a:fld id="{151E060D-FAFC-4189-907A-7AE29CACBD1A}" type="slidenum">
+              <a:rPr lang="en-US" smtClean="0"/>
+              <a:t>22</a:t>
+            </a:fld>
+            <a:endParaRPr lang="en-US"/>
           </a:p>
         </p:txBody>
       </p:sp>
@@ -10885,6 +11311,35 @@
           </a:fontRef>
         </p:style>
       </p:cxnSp>
+      <p:sp>
+        <p:nvSpPr>
+          <p:cNvPr id="6" name="Slide Number Placeholder 5">
+            <a:extLst>
+              <a:ext uri="{FF2B5EF4-FFF2-40B4-BE49-F238E27FC236}">
+                <a16:creationId xmlns:a16="http://schemas.microsoft.com/office/drawing/2014/main" id="{8B5663F6-0B22-5E6F-3DA7-ACC04F35B805}"/>
+              </a:ext>
+            </a:extLst>
+          </p:cNvPr>
+          <p:cNvSpPr>
+            <a:spLocks noGrp="1"/>
+          </p:cNvSpPr>
+          <p:nvPr>
+            <p:ph type="sldNum" sz="quarter" idx="12"/>
+          </p:nvPr>
+        </p:nvSpPr>
+        <p:spPr/>
+        <p:txBody>
+          <a:bodyPr/>
+          <a:lstStyle/>
+          <a:p>
+            <a:fld id="{151E060D-FAFC-4189-907A-7AE29CACBD1A}" type="slidenum">
+              <a:rPr lang="en-US" smtClean="0"/>
+              <a:t>23</a:t>
+            </a:fld>
+            <a:endParaRPr lang="en-US"/>
+          </a:p>
+        </p:txBody>
+      </p:sp>
     </p:spTree>
     <p:extLst>
       <p:ext uri="{BB962C8B-B14F-4D97-AF65-F5344CB8AC3E}">
@@ -11439,6 +11894,35 @@
           </a:xfrm>
         </p:spPr>
       </p:pic>
+      <p:sp>
+        <p:nvSpPr>
+          <p:cNvPr id="6" name="Slide Number Placeholder 5">
+            <a:extLst>
+              <a:ext uri="{FF2B5EF4-FFF2-40B4-BE49-F238E27FC236}">
+                <a16:creationId xmlns:a16="http://schemas.microsoft.com/office/drawing/2014/main" id="{F1999AC5-20A3-234C-5276-ABEDC9D85EC3}"/>
+              </a:ext>
+            </a:extLst>
+          </p:cNvPr>
+          <p:cNvSpPr>
+            <a:spLocks noGrp="1"/>
+          </p:cNvSpPr>
+          <p:nvPr>
+            <p:ph type="sldNum" sz="quarter" idx="12"/>
+          </p:nvPr>
+        </p:nvSpPr>
+        <p:spPr/>
+        <p:txBody>
+          <a:bodyPr/>
+          <a:lstStyle/>
+          <a:p>
+            <a:fld id="{151E060D-FAFC-4189-907A-7AE29CACBD1A}" type="slidenum">
+              <a:rPr lang="en-US" smtClean="0"/>
+              <a:t>24</a:t>
+            </a:fld>
+            <a:endParaRPr lang="en-US"/>
+          </a:p>
+        </p:txBody>
+      </p:sp>
     </p:spTree>
     <p:extLst>
       <p:ext uri="{BB962C8B-B14F-4D97-AF65-F5344CB8AC3E}">
@@ -11620,6 +12104,35 @@
           </a:fontRef>
         </p:style>
       </p:cxnSp>
+      <p:sp>
+        <p:nvSpPr>
+          <p:cNvPr id="4" name="Slide Number Placeholder 3">
+            <a:extLst>
+              <a:ext uri="{FF2B5EF4-FFF2-40B4-BE49-F238E27FC236}">
+                <a16:creationId xmlns:a16="http://schemas.microsoft.com/office/drawing/2014/main" id="{2F8031D8-053A-2403-AE77-A233C56984F6}"/>
+              </a:ext>
+            </a:extLst>
+          </p:cNvPr>
+          <p:cNvSpPr>
+            <a:spLocks noGrp="1"/>
+          </p:cNvSpPr>
+          <p:nvPr>
+            <p:ph type="sldNum" sz="quarter" idx="12"/>
+          </p:nvPr>
+        </p:nvSpPr>
+        <p:spPr/>
+        <p:txBody>
+          <a:bodyPr/>
+          <a:lstStyle/>
+          <a:p>
+            <a:fld id="{151E060D-FAFC-4189-907A-7AE29CACBD1A}" type="slidenum">
+              <a:rPr lang="en-US" smtClean="0"/>
+              <a:t>25</a:t>
+            </a:fld>
+            <a:endParaRPr lang="en-US"/>
+          </a:p>
+        </p:txBody>
+      </p:sp>
     </p:spTree>
     <p:extLst>
       <p:ext uri="{BB962C8B-B14F-4D97-AF65-F5344CB8AC3E}">
@@ -12226,6 +12739,35 @@
           </a:fontRef>
         </p:style>
       </p:cxnSp>
+      <p:sp>
+        <p:nvSpPr>
+          <p:cNvPr id="6" name="Slide Number Placeholder 5">
+            <a:extLst>
+              <a:ext uri="{FF2B5EF4-FFF2-40B4-BE49-F238E27FC236}">
+                <a16:creationId xmlns:a16="http://schemas.microsoft.com/office/drawing/2014/main" id="{59817C04-9721-7A12-03F1-91F84093BD1A}"/>
+              </a:ext>
+            </a:extLst>
+          </p:cNvPr>
+          <p:cNvSpPr>
+            <a:spLocks noGrp="1"/>
+          </p:cNvSpPr>
+          <p:nvPr>
+            <p:ph type="sldNum" sz="quarter" idx="12"/>
+          </p:nvPr>
+        </p:nvSpPr>
+        <p:spPr/>
+        <p:txBody>
+          <a:bodyPr/>
+          <a:lstStyle/>
+          <a:p>
+            <a:fld id="{151E060D-FAFC-4189-907A-7AE29CACBD1A}" type="slidenum">
+              <a:rPr lang="en-US" smtClean="0"/>
+              <a:t>26</a:t>
+            </a:fld>
+            <a:endParaRPr lang="en-US"/>
+          </a:p>
+        </p:txBody>
+      </p:sp>
     </p:spTree>
     <p:extLst>
       <p:ext uri="{BB962C8B-B14F-4D97-AF65-F5344CB8AC3E}">
@@ -12745,6 +13287,35 @@
           </a:fontRef>
         </p:style>
       </p:cxnSp>
+      <p:sp>
+        <p:nvSpPr>
+          <p:cNvPr id="6" name="Slide Number Placeholder 5">
+            <a:extLst>
+              <a:ext uri="{FF2B5EF4-FFF2-40B4-BE49-F238E27FC236}">
+                <a16:creationId xmlns:a16="http://schemas.microsoft.com/office/drawing/2014/main" id="{427CA8A0-4970-4E49-FD3C-B19C44CCF961}"/>
+              </a:ext>
+            </a:extLst>
+          </p:cNvPr>
+          <p:cNvSpPr>
+            <a:spLocks noGrp="1"/>
+          </p:cNvSpPr>
+          <p:nvPr>
+            <p:ph type="sldNum" sz="quarter" idx="12"/>
+          </p:nvPr>
+        </p:nvSpPr>
+        <p:spPr/>
+        <p:txBody>
+          <a:bodyPr/>
+          <a:lstStyle/>
+          <a:p>
+            <a:fld id="{151E060D-FAFC-4189-907A-7AE29CACBD1A}" type="slidenum">
+              <a:rPr lang="en-US" smtClean="0"/>
+              <a:t>27</a:t>
+            </a:fld>
+            <a:endParaRPr lang="en-US"/>
+          </a:p>
+        </p:txBody>
+      </p:sp>
     </p:spTree>
     <p:extLst>
       <p:ext uri="{BB962C8B-B14F-4D97-AF65-F5344CB8AC3E}">
@@ -12982,6 +13553,35 @@
               </a:rPr>
               <a:t> is the more effective choice for detailed rule-level analysis due to its code-aware training.</a:t>
             </a:r>
+          </a:p>
+        </p:txBody>
+      </p:sp>
+      <p:sp>
+        <p:nvSpPr>
+          <p:cNvPr id="5" name="Slide Number Placeholder 4">
+            <a:extLst>
+              <a:ext uri="{FF2B5EF4-FFF2-40B4-BE49-F238E27FC236}">
+                <a16:creationId xmlns:a16="http://schemas.microsoft.com/office/drawing/2014/main" id="{E3592359-09D9-EC4F-B5AF-4CD3EFE56EBD}"/>
+              </a:ext>
+            </a:extLst>
+          </p:cNvPr>
+          <p:cNvSpPr>
+            <a:spLocks noGrp="1"/>
+          </p:cNvSpPr>
+          <p:nvPr>
+            <p:ph type="sldNum" sz="quarter" idx="12"/>
+          </p:nvPr>
+        </p:nvSpPr>
+        <p:spPr/>
+        <p:txBody>
+          <a:bodyPr/>
+          <a:lstStyle/>
+          <a:p>
+            <a:fld id="{151E060D-FAFC-4189-907A-7AE29CACBD1A}" type="slidenum">
+              <a:rPr lang="en-US" smtClean="0"/>
+              <a:t>28</a:t>
+            </a:fld>
+            <a:endParaRPr lang="en-US"/>
           </a:p>
         </p:txBody>
       </p:sp>
@@ -13140,6 +13740,35 @@
               </a:rPr>
               <a:t> technologies such as Terraform, CloudFormation, and Ansible</a:t>
             </a:r>
+          </a:p>
+        </p:txBody>
+      </p:sp>
+      <p:sp>
+        <p:nvSpPr>
+          <p:cNvPr id="5" name="Slide Number Placeholder 4">
+            <a:extLst>
+              <a:ext uri="{FF2B5EF4-FFF2-40B4-BE49-F238E27FC236}">
+                <a16:creationId xmlns:a16="http://schemas.microsoft.com/office/drawing/2014/main" id="{C2D7FF54-2CBC-D50B-BD93-0CC70FA49D9C}"/>
+              </a:ext>
+            </a:extLst>
+          </p:cNvPr>
+          <p:cNvSpPr>
+            <a:spLocks noGrp="1"/>
+          </p:cNvSpPr>
+          <p:nvPr>
+            <p:ph type="sldNum" sz="quarter" idx="12"/>
+          </p:nvPr>
+        </p:nvSpPr>
+        <p:spPr/>
+        <p:txBody>
+          <a:bodyPr/>
+          <a:lstStyle/>
+          <a:p>
+            <a:fld id="{151E060D-FAFC-4189-907A-7AE29CACBD1A}" type="slidenum">
+              <a:rPr lang="en-US" smtClean="0"/>
+              <a:t>29</a:t>
+            </a:fld>
+            <a:endParaRPr lang="en-US"/>
           </a:p>
         </p:txBody>
       </p:sp>
@@ -13605,6 +14234,35 @@
           </a:p>
         </p:txBody>
       </p:sp>
+      <p:sp>
+        <p:nvSpPr>
+          <p:cNvPr id="6" name="Slide Number Placeholder 5">
+            <a:extLst>
+              <a:ext uri="{FF2B5EF4-FFF2-40B4-BE49-F238E27FC236}">
+                <a16:creationId xmlns:a16="http://schemas.microsoft.com/office/drawing/2014/main" id="{C1359446-F268-6F5E-0465-7F69A540A0DA}"/>
+              </a:ext>
+            </a:extLst>
+          </p:cNvPr>
+          <p:cNvSpPr>
+            <a:spLocks noGrp="1"/>
+          </p:cNvSpPr>
+          <p:nvPr>
+            <p:ph type="sldNum" sz="quarter" idx="12"/>
+          </p:nvPr>
+        </p:nvSpPr>
+        <p:spPr/>
+        <p:txBody>
+          <a:bodyPr/>
+          <a:lstStyle/>
+          <a:p>
+            <a:fld id="{151E060D-FAFC-4189-907A-7AE29CACBD1A}" type="slidenum">
+              <a:rPr lang="en-US" smtClean="0"/>
+              <a:t>3</a:t>
+            </a:fld>
+            <a:endParaRPr lang="en-US"/>
+          </a:p>
+        </p:txBody>
+      </p:sp>
     </p:spTree>
     <p:extLst>
       <p:ext uri="{BB962C8B-B14F-4D97-AF65-F5344CB8AC3E}">
@@ -13835,6 +14493,35 @@
           </a:p>
         </p:txBody>
       </p:sp>
+      <p:sp>
+        <p:nvSpPr>
+          <p:cNvPr id="5" name="Slide Number Placeholder 4">
+            <a:extLst>
+              <a:ext uri="{FF2B5EF4-FFF2-40B4-BE49-F238E27FC236}">
+                <a16:creationId xmlns:a16="http://schemas.microsoft.com/office/drawing/2014/main" id="{8DB82748-ED39-A4E6-096C-53C817F1441D}"/>
+              </a:ext>
+            </a:extLst>
+          </p:cNvPr>
+          <p:cNvSpPr>
+            <a:spLocks noGrp="1"/>
+          </p:cNvSpPr>
+          <p:nvPr>
+            <p:ph type="sldNum" sz="quarter" idx="12"/>
+          </p:nvPr>
+        </p:nvSpPr>
+        <p:spPr/>
+        <p:txBody>
+          <a:bodyPr/>
+          <a:lstStyle/>
+          <a:p>
+            <a:fld id="{151E060D-FAFC-4189-907A-7AE29CACBD1A}" type="slidenum">
+              <a:rPr lang="en-US" smtClean="0"/>
+              <a:t>30</a:t>
+            </a:fld>
+            <a:endParaRPr lang="en-US"/>
+          </a:p>
+        </p:txBody>
+      </p:sp>
     </p:spTree>
     <p:extLst>
       <p:ext uri="{BB962C8B-B14F-4D97-AF65-F5344CB8AC3E}">
@@ -14146,6 +14833,35 @@
           </a:p>
         </p:txBody>
       </p:sp>
+      <p:sp>
+        <p:nvSpPr>
+          <p:cNvPr id="5" name="Slide Number Placeholder 4">
+            <a:extLst>
+              <a:ext uri="{FF2B5EF4-FFF2-40B4-BE49-F238E27FC236}">
+                <a16:creationId xmlns:a16="http://schemas.microsoft.com/office/drawing/2014/main" id="{33359994-CF5B-4C39-572D-62D8AF10B4AA}"/>
+              </a:ext>
+            </a:extLst>
+          </p:cNvPr>
+          <p:cNvSpPr>
+            <a:spLocks noGrp="1"/>
+          </p:cNvSpPr>
+          <p:nvPr>
+            <p:ph type="sldNum" sz="quarter" idx="12"/>
+          </p:nvPr>
+        </p:nvSpPr>
+        <p:spPr/>
+        <p:txBody>
+          <a:bodyPr/>
+          <a:lstStyle/>
+          <a:p>
+            <a:fld id="{151E060D-FAFC-4189-907A-7AE29CACBD1A}" type="slidenum">
+              <a:rPr lang="en-US" smtClean="0"/>
+              <a:t>31</a:t>
+            </a:fld>
+            <a:endParaRPr lang="en-US"/>
+          </a:p>
+        </p:txBody>
+      </p:sp>
     </p:spTree>
     <p:extLst>
       <p:ext uri="{BB962C8B-B14F-4D97-AF65-F5344CB8AC3E}">
@@ -14454,6 +15170,35 @@
           </a:p>
         </p:txBody>
       </p:sp>
+      <p:sp>
+        <p:nvSpPr>
+          <p:cNvPr id="5" name="Slide Number Placeholder 4">
+            <a:extLst>
+              <a:ext uri="{FF2B5EF4-FFF2-40B4-BE49-F238E27FC236}">
+                <a16:creationId xmlns:a16="http://schemas.microsoft.com/office/drawing/2014/main" id="{48B1EE47-81F3-2C76-D31F-40851FDCEAAE}"/>
+              </a:ext>
+            </a:extLst>
+          </p:cNvPr>
+          <p:cNvSpPr>
+            <a:spLocks noGrp="1"/>
+          </p:cNvSpPr>
+          <p:nvPr>
+            <p:ph type="sldNum" sz="quarter" idx="12"/>
+          </p:nvPr>
+        </p:nvSpPr>
+        <p:spPr/>
+        <p:txBody>
+          <a:bodyPr/>
+          <a:lstStyle/>
+          <a:p>
+            <a:fld id="{151E060D-FAFC-4189-907A-7AE29CACBD1A}" type="slidenum">
+              <a:rPr lang="en-US" smtClean="0"/>
+              <a:t>32</a:t>
+            </a:fld>
+            <a:endParaRPr lang="en-US"/>
+          </a:p>
+        </p:txBody>
+      </p:sp>
     </p:spTree>
     <p:extLst>
       <p:ext uri="{BB962C8B-B14F-4D97-AF65-F5344CB8AC3E}">
@@ -14514,6 +15259,35 @@
               <a:t>Thank you!!!</a:t>
             </a:r>
             <a:endParaRPr lang="en-US" sz="4400" dirty="0"/>
+          </a:p>
+        </p:txBody>
+      </p:sp>
+      <p:sp>
+        <p:nvSpPr>
+          <p:cNvPr id="4" name="Slide Number Placeholder 3">
+            <a:extLst>
+              <a:ext uri="{FF2B5EF4-FFF2-40B4-BE49-F238E27FC236}">
+                <a16:creationId xmlns:a16="http://schemas.microsoft.com/office/drawing/2014/main" id="{40120819-4C75-4BDD-C713-86ABEDA9B1F2}"/>
+              </a:ext>
+            </a:extLst>
+          </p:cNvPr>
+          <p:cNvSpPr>
+            <a:spLocks noGrp="1"/>
+          </p:cNvSpPr>
+          <p:nvPr>
+            <p:ph type="sldNum" sz="quarter" idx="12"/>
+          </p:nvPr>
+        </p:nvSpPr>
+        <p:spPr/>
+        <p:txBody>
+          <a:bodyPr/>
+          <a:lstStyle/>
+          <a:p>
+            <a:fld id="{151E060D-FAFC-4189-907A-7AE29CACBD1A}" type="slidenum">
+              <a:rPr lang="en-US" smtClean="0"/>
+              <a:t>33</a:t>
+            </a:fld>
+            <a:endParaRPr lang="en-US"/>
           </a:p>
         </p:txBody>
       </p:sp>
@@ -14700,6 +15474,35 @@
           </a:p>
         </p:txBody>
       </p:sp>
+      <p:sp>
+        <p:nvSpPr>
+          <p:cNvPr id="5" name="Slide Number Placeholder 4">
+            <a:extLst>
+              <a:ext uri="{FF2B5EF4-FFF2-40B4-BE49-F238E27FC236}">
+                <a16:creationId xmlns:a16="http://schemas.microsoft.com/office/drawing/2014/main" id="{5E1020C4-F4CF-CEA8-391A-562CFAEF76D7}"/>
+              </a:ext>
+            </a:extLst>
+          </p:cNvPr>
+          <p:cNvSpPr>
+            <a:spLocks noGrp="1"/>
+          </p:cNvSpPr>
+          <p:nvPr>
+            <p:ph type="sldNum" sz="quarter" idx="12"/>
+          </p:nvPr>
+        </p:nvSpPr>
+        <p:spPr/>
+        <p:txBody>
+          <a:bodyPr/>
+          <a:lstStyle/>
+          <a:p>
+            <a:fld id="{151E060D-FAFC-4189-907A-7AE29CACBD1A}" type="slidenum">
+              <a:rPr lang="en-US" smtClean="0"/>
+              <a:t>4</a:t>
+            </a:fld>
+            <a:endParaRPr lang="en-US"/>
+          </a:p>
+        </p:txBody>
+      </p:sp>
     </p:spTree>
     <p:extLst>
       <p:ext uri="{BB962C8B-B14F-4D97-AF65-F5344CB8AC3E}">
@@ -14794,6 +15597,35 @@
           </a:p>
         </p:txBody>
       </p:sp>
+      <p:sp>
+        <p:nvSpPr>
+          <p:cNvPr id="4" name="Slide Number Placeholder 3">
+            <a:extLst>
+              <a:ext uri="{FF2B5EF4-FFF2-40B4-BE49-F238E27FC236}">
+                <a16:creationId xmlns:a16="http://schemas.microsoft.com/office/drawing/2014/main" id="{53CB7B53-B632-F6F5-9082-822D825B28AF}"/>
+              </a:ext>
+            </a:extLst>
+          </p:cNvPr>
+          <p:cNvSpPr>
+            <a:spLocks noGrp="1"/>
+          </p:cNvSpPr>
+          <p:nvPr>
+            <p:ph type="sldNum" sz="quarter" idx="12"/>
+          </p:nvPr>
+        </p:nvSpPr>
+        <p:spPr/>
+        <p:txBody>
+          <a:bodyPr/>
+          <a:lstStyle/>
+          <a:p>
+            <a:fld id="{151E060D-FAFC-4189-907A-7AE29CACBD1A}" type="slidenum">
+              <a:rPr lang="en-US" smtClean="0"/>
+              <a:t>5</a:t>
+            </a:fld>
+            <a:endParaRPr lang="en-US"/>
+          </a:p>
+        </p:txBody>
+      </p:sp>
     </p:spTree>
     <p:extLst>
       <p:ext uri="{BB962C8B-B14F-4D97-AF65-F5344CB8AC3E}">
@@ -14965,6 +15797,35 @@
           </a:p>
           <a:p>
             <a:endParaRPr lang="en-NP" dirty="0"/>
+          </a:p>
+        </p:txBody>
+      </p:sp>
+      <p:sp>
+        <p:nvSpPr>
+          <p:cNvPr id="5" name="Slide Number Placeholder 4">
+            <a:extLst>
+              <a:ext uri="{FF2B5EF4-FFF2-40B4-BE49-F238E27FC236}">
+                <a16:creationId xmlns:a16="http://schemas.microsoft.com/office/drawing/2014/main" id="{E9974D72-C26E-04E2-B6EF-6E82842AA1A9}"/>
+              </a:ext>
+            </a:extLst>
+          </p:cNvPr>
+          <p:cNvSpPr>
+            <a:spLocks noGrp="1"/>
+          </p:cNvSpPr>
+          <p:nvPr>
+            <p:ph type="sldNum" sz="quarter" idx="12"/>
+          </p:nvPr>
+        </p:nvSpPr>
+        <p:spPr/>
+        <p:txBody>
+          <a:bodyPr/>
+          <a:lstStyle/>
+          <a:p>
+            <a:fld id="{151E060D-FAFC-4189-907A-7AE29CACBD1A}" type="slidenum">
+              <a:rPr lang="en-US" smtClean="0"/>
+              <a:t>6</a:t>
+            </a:fld>
+            <a:endParaRPr lang="en-US"/>
           </a:p>
         </p:txBody>
       </p:sp>
@@ -15603,6 +16464,35 @@
           </a:fontRef>
         </p:style>
       </p:cxnSp>
+      <p:sp>
+        <p:nvSpPr>
+          <p:cNvPr id="8" name="Slide Number Placeholder 7">
+            <a:extLst>
+              <a:ext uri="{FF2B5EF4-FFF2-40B4-BE49-F238E27FC236}">
+                <a16:creationId xmlns:a16="http://schemas.microsoft.com/office/drawing/2014/main" id="{4972561F-E5F8-95BF-F4D4-829F07A5B4BD}"/>
+              </a:ext>
+            </a:extLst>
+          </p:cNvPr>
+          <p:cNvSpPr>
+            <a:spLocks noGrp="1"/>
+          </p:cNvSpPr>
+          <p:nvPr>
+            <p:ph type="sldNum" sz="quarter" idx="12"/>
+          </p:nvPr>
+        </p:nvSpPr>
+        <p:spPr/>
+        <p:txBody>
+          <a:bodyPr/>
+          <a:lstStyle/>
+          <a:p>
+            <a:fld id="{151E060D-FAFC-4189-907A-7AE29CACBD1A}" type="slidenum">
+              <a:rPr lang="en-US" smtClean="0"/>
+              <a:t>7</a:t>
+            </a:fld>
+            <a:endParaRPr lang="en-US"/>
+          </a:p>
+        </p:txBody>
+      </p:sp>
     </p:spTree>
     <p:extLst>
       <p:ext uri="{BB962C8B-B14F-4D97-AF65-F5344CB8AC3E}">
@@ -15794,6 +16684,35 @@
               <a:latin typeface="Times New Roman" panose="02020603050405020304" pitchFamily="18" charset="0"/>
               <a:cs typeface="Times New Roman" panose="02020603050405020304" pitchFamily="18" charset="0"/>
             </a:endParaRPr>
+          </a:p>
+        </p:txBody>
+      </p:sp>
+      <p:sp>
+        <p:nvSpPr>
+          <p:cNvPr id="5" name="Slide Number Placeholder 4">
+            <a:extLst>
+              <a:ext uri="{FF2B5EF4-FFF2-40B4-BE49-F238E27FC236}">
+                <a16:creationId xmlns:a16="http://schemas.microsoft.com/office/drawing/2014/main" id="{38AA42C8-6A16-A8DA-B581-1E73AEBF6C5B}"/>
+              </a:ext>
+            </a:extLst>
+          </p:cNvPr>
+          <p:cNvSpPr>
+            <a:spLocks noGrp="1"/>
+          </p:cNvSpPr>
+          <p:nvPr>
+            <p:ph type="sldNum" sz="quarter" idx="12"/>
+          </p:nvPr>
+        </p:nvSpPr>
+        <p:spPr/>
+        <p:txBody>
+          <a:bodyPr/>
+          <a:lstStyle/>
+          <a:p>
+            <a:fld id="{151E060D-FAFC-4189-907A-7AE29CACBD1A}" type="slidenum">
+              <a:rPr lang="en-US" smtClean="0"/>
+              <a:t>8</a:t>
+            </a:fld>
+            <a:endParaRPr lang="en-US"/>
           </a:p>
         </p:txBody>
       </p:sp>
@@ -16201,6 +17120,35 @@
           </a:fontRef>
         </p:style>
       </p:cxnSp>
+      <p:sp>
+        <p:nvSpPr>
+          <p:cNvPr id="6" name="Slide Number Placeholder 5">
+            <a:extLst>
+              <a:ext uri="{FF2B5EF4-FFF2-40B4-BE49-F238E27FC236}">
+                <a16:creationId xmlns:a16="http://schemas.microsoft.com/office/drawing/2014/main" id="{B3DCB9E5-1887-B83B-DF0D-16CCCB598BAB}"/>
+              </a:ext>
+            </a:extLst>
+          </p:cNvPr>
+          <p:cNvSpPr>
+            <a:spLocks noGrp="1"/>
+          </p:cNvSpPr>
+          <p:nvPr>
+            <p:ph type="sldNum" sz="quarter" idx="12"/>
+          </p:nvPr>
+        </p:nvSpPr>
+        <p:spPr/>
+        <p:txBody>
+          <a:bodyPr/>
+          <a:lstStyle/>
+          <a:p>
+            <a:fld id="{151E060D-FAFC-4189-907A-7AE29CACBD1A}" type="slidenum">
+              <a:rPr lang="en-US" smtClean="0"/>
+              <a:t>9</a:t>
+            </a:fld>
+            <a:endParaRPr lang="en-US"/>
+          </a:p>
+        </p:txBody>
+      </p:sp>
     </p:spTree>
     <p:extLst>
       <p:ext uri="{BB962C8B-B14F-4D97-AF65-F5344CB8AC3E}">

</xml_diff>